<commit_message>
fixed up final slide
</commit_message>
<xml_diff>
--- a/Wi18_content/DSMCER/L6.Descriptive_Statistics.pptx
+++ b/Wi18_content/DSMCER/L6.Descriptive_Statistics.pptx
@@ -8509,13 +8509,89 @@
               <a:rPr lang="en-US" dirty="0" smtClean="0">
                 <a:latin typeface="Calibri" charset="0"/>
               </a:rPr>
-              <a:t> notebook for </a:t>
+              <a:t> notebook for practical demonstration!</a:t>
+            </a:r>
+          </a:p>
+          <a:p>
+            <a:pPr>
+              <a:spcBef>
+                <a:spcPts val="800"/>
+              </a:spcBef>
+              <a:buFont typeface="Arial" charset="0"/>
+              <a:buChar char="•"/>
+              <a:defRPr/>
+            </a:pPr>
+            <a:endParaRPr lang="en-US" dirty="0">
+              <a:latin typeface="Calibri" charset="0"/>
+            </a:endParaRPr>
+          </a:p>
+          <a:p>
+            <a:pPr>
+              <a:spcBef>
+                <a:spcPts val="800"/>
+              </a:spcBef>
+              <a:buFont typeface="Arial" charset="0"/>
+              <a:buChar char="•"/>
+              <a:defRPr/>
+            </a:pPr>
+            <a:r>
+              <a:rPr lang="en-US" dirty="0" smtClean="0">
+                <a:latin typeface="Calibri" charset="0"/>
+              </a:rPr>
+              <a:t>Download the notebook and open it in </a:t>
+            </a:r>
+            <a:r>
+              <a:rPr lang="en-US" dirty="0" err="1" smtClean="0">
+                <a:latin typeface="Calibri" charset="0"/>
+              </a:rPr>
+              <a:t>jupyter</a:t>
+            </a:r>
+            <a:r>
+              <a:rPr lang="en-US" dirty="0" smtClean="0">
+                <a:latin typeface="Calibri" charset="0"/>
+              </a:rPr>
+              <a:t> notebook.</a:t>
+            </a:r>
+            <a:endParaRPr lang="en-US" dirty="0">
+              <a:latin typeface="Calibri" charset="0"/>
+            </a:endParaRPr>
+          </a:p>
+          <a:p>
+            <a:pPr>
+              <a:spcBef>
+                <a:spcPts val="800"/>
+              </a:spcBef>
+              <a:buFont typeface="Arial" charset="0"/>
+              <a:buChar char="•"/>
+              <a:defRPr/>
+            </a:pPr>
+            <a:r>
+              <a:rPr lang="en-US" dirty="0" smtClean="0">
+                <a:latin typeface="Calibri" charset="0"/>
+              </a:rPr>
+              <a:t>Pair up with another individual in the class and go through the notebook.</a:t>
+            </a:r>
+          </a:p>
+          <a:p>
+            <a:pPr>
+              <a:spcBef>
+                <a:spcPts val="800"/>
+              </a:spcBef>
+              <a:buFont typeface="Arial" charset="0"/>
+              <a:buChar char="•"/>
+              <a:defRPr/>
+            </a:pPr>
+            <a:r>
+              <a:rPr lang="en-US" dirty="0" smtClean="0">
+                <a:latin typeface="Calibri" charset="0"/>
+              </a:rPr>
+              <a:t>This notebook will challenge you.  It will </a:t>
             </a:r>
             <a:r>
               <a:rPr lang="en-US" smtClean="0">
                 <a:latin typeface="Calibri" charset="0"/>
               </a:rPr>
-              <a:t>practical demonstration</a:t>
+              <a:t>require you use SEDS and DSMCER knowledge</a:t>
             </a:r>
             <a:endParaRPr lang="en-US" dirty="0" smtClean="0">
               <a:latin typeface="Calibri" charset="0"/>

</xml_diff>

<commit_message>
fixed up some formatting issues, spelling, and duplicate slide
</commit_message>
<xml_diff>
--- a/Wi18_content/DSMCER/L6.Descriptive_Statistics.pptx
+++ b/Wi18_content/DSMCER/L6.Descriptive_Statistics.pptx
@@ -5030,13 +5030,13 @@
         </p:spPr>
         <p:txBody>
           <a:bodyPr>
-            <a:normAutofit/>
+            <a:normAutofit fontScale="90000"/>
           </a:bodyPr>
           <a:lstStyle/>
           <a:p>
             <a:r>
               <a:rPr lang="en-US" sz="3600" dirty="0" smtClean="0"/>
-              <a:t>Software Engineering for Data Scientists</a:t>
+              <a:t>Data Science Methods for Cutting-edge Tec</a:t>
             </a:r>
             <a:endParaRPr lang="en-US" sz="3600" dirty="0"/>
           </a:p>
@@ -5798,13 +5798,7 @@
               <a:rPr lang="en-US" dirty="0" smtClean="0">
                 <a:latin typeface="Calibri" charset="0"/>
               </a:rPr>
-              <a:t>) </a:t>
-            </a:r>
-            <a:r>
-              <a:rPr lang="en-US" dirty="0" smtClean="0">
-                <a:latin typeface="Calibri" charset="0"/>
-              </a:rPr>
-              <a:t>and </a:t>
+              <a:t>) and </a:t>
             </a:r>
             <a:r>
               <a:rPr lang="en-US" dirty="0" err="1" smtClean="0">
@@ -6064,13 +6058,7 @@
               <a:rPr lang="en-US" dirty="0" smtClean="0">
                 <a:latin typeface="Calibri" charset="0"/>
               </a:rPr>
-              <a:t> e.g. C below</a:t>
-            </a:r>
-            <a:r>
-              <a:rPr lang="en-US" dirty="0" smtClean="0">
-                <a:latin typeface="Calibri" charset="0"/>
-              </a:rPr>
-              <a:t> </a:t>
+              <a:t> e.g. C below </a:t>
             </a:r>
           </a:p>
         </p:txBody>
@@ -6447,7 +6435,19 @@
               <a:rPr lang="is-IS" dirty="0" smtClean="0">
                 <a:latin typeface="Calibri" charset="0"/>
               </a:rPr>
-              <a:t>Sample without replacement (</a:t>
+              <a:t>Sample </a:t>
+            </a:r>
+            <a:r>
+              <a:rPr lang="is-IS" dirty="0" smtClean="0">
+                <a:latin typeface="Calibri" charset="0"/>
+              </a:rPr>
+              <a:t>with </a:t>
+            </a:r>
+            <a:r>
+              <a:rPr lang="is-IS" dirty="0" smtClean="0">
+                <a:latin typeface="Calibri" charset="0"/>
+              </a:rPr>
+              <a:t>replacement (</a:t>
             </a:r>
             <a:r>
               <a:rPr lang="en-US" i="1" dirty="0">
@@ -6497,8 +6497,17 @@
               <a:rPr lang="is-IS" dirty="0" smtClean="0">
                 <a:latin typeface="Calibri" charset="0"/>
               </a:rPr>
-              <a:t>Second sample?</a:t>
-            </a:r>
+              <a:t>Second </a:t>
+            </a:r>
+            <a:r>
+              <a:rPr lang="is-IS" dirty="0" smtClean="0">
+                <a:latin typeface="Calibri" charset="0"/>
+              </a:rPr>
+              <a:t>sample, each item has 1/7 probability</a:t>
+            </a:r>
+            <a:endParaRPr lang="is-IS" dirty="0" smtClean="0">
+              <a:latin typeface="Calibri" charset="0"/>
+            </a:endParaRPr>
           </a:p>
           <a:p>
             <a:pPr lvl="2">
@@ -6513,7 +6522,29 @@
               <a:rPr lang="is-IS" dirty="0" smtClean="0">
                 <a:latin typeface="Calibri" charset="0"/>
               </a:rPr>
-              <a:t>How many total possibilities (assuming order is important)?</a:t>
+              <a:t>How many total possibilities (assuming order is important</a:t>
+            </a:r>
+            <a:r>
+              <a:rPr lang="is-IS" dirty="0" smtClean="0">
+                <a:latin typeface="Calibri" charset="0"/>
+              </a:rPr>
+              <a:t>)?</a:t>
+            </a:r>
+          </a:p>
+          <a:p>
+            <a:pPr lvl="3">
+              <a:spcBef>
+                <a:spcPts val="800"/>
+              </a:spcBef>
+              <a:buFont typeface="Arial" charset="0"/>
+              <a:buChar char="•"/>
+              <a:defRPr/>
+            </a:pPr>
+            <a:r>
+              <a:rPr lang="is-IS" dirty="0" smtClean="0">
+                <a:latin typeface="Calibri" charset="0"/>
+              </a:rPr>
+              <a:t>49</a:t>
             </a:r>
             <a:endParaRPr lang="en-US" dirty="0" smtClean="0">
               <a:latin typeface="Calibri" charset="0"/>
@@ -6700,8 +6731,17 @@
               <a:rPr lang="is-IS" dirty="0" smtClean="0">
                 <a:latin typeface="Calibri" charset="0"/>
               </a:rPr>
-              <a:t>Second sample?</a:t>
-            </a:r>
+              <a:t>Second sample</a:t>
+            </a:r>
+            <a:r>
+              <a:rPr lang="is-IS" dirty="0" smtClean="0">
+                <a:latin typeface="Calibri" charset="0"/>
+              </a:rPr>
+              <a:t>? 1/6</a:t>
+            </a:r>
+            <a:endParaRPr lang="is-IS" dirty="0" smtClean="0">
+              <a:latin typeface="Calibri" charset="0"/>
+            </a:endParaRPr>
           </a:p>
           <a:p>
             <a:pPr lvl="2">
@@ -6716,7 +6756,29 @@
               <a:rPr lang="is-IS" dirty="0" smtClean="0">
                 <a:latin typeface="Calibri" charset="0"/>
               </a:rPr>
-              <a:t>How many total possibilities (assuming order is important)?</a:t>
+              <a:t>How many total possibilities (assuming order is important</a:t>
+            </a:r>
+            <a:r>
+              <a:rPr lang="is-IS" dirty="0" smtClean="0">
+                <a:latin typeface="Calibri" charset="0"/>
+              </a:rPr>
+              <a:t>)?</a:t>
+            </a:r>
+          </a:p>
+          <a:p>
+            <a:pPr lvl="3">
+              <a:spcBef>
+                <a:spcPts val="800"/>
+              </a:spcBef>
+              <a:buFont typeface="Arial" charset="0"/>
+              <a:buChar char="•"/>
+              <a:defRPr/>
+            </a:pPr>
+            <a:r>
+              <a:rPr lang="is-IS" dirty="0" smtClean="0">
+                <a:latin typeface="Calibri" charset="0"/>
+              </a:rPr>
+              <a:t>42</a:t>
             </a:r>
             <a:endParaRPr lang="en-US" dirty="0" smtClean="0">
               <a:latin typeface="Calibri" charset="0"/>
@@ -7203,8 +7265,27 @@
                 <a:ea typeface="Handwriting - Dakota" charset="0"/>
                 <a:cs typeface="Handwriting - Dakota" charset="0"/>
               </a:rPr>
-              <a:t>Super important concept alter!</a:t>
-            </a:r>
+              <a:t>Super important concept </a:t>
+            </a:r>
+            <a:r>
+              <a:rPr lang="en-US" b="1" dirty="0" smtClean="0">
+                <a:solidFill>
+                  <a:srgbClr val="FF0000"/>
+                </a:solidFill>
+                <a:latin typeface="Handwriting - Dakota" charset="0"/>
+                <a:ea typeface="Handwriting - Dakota" charset="0"/>
+                <a:cs typeface="Handwriting - Dakota" charset="0"/>
+              </a:rPr>
+              <a:t>alert!</a:t>
+            </a:r>
+            <a:endParaRPr lang="en-US" b="1" dirty="0" smtClean="0">
+              <a:solidFill>
+                <a:srgbClr val="FF0000"/>
+              </a:solidFill>
+              <a:latin typeface="Handwriting - Dakota" charset="0"/>
+              <a:ea typeface="Handwriting - Dakota" charset="0"/>
+              <a:cs typeface="Handwriting - Dakota" charset="0"/>
+            </a:endParaRPr>
           </a:p>
           <a:p>
             <a:pPr>
@@ -7249,9 +7330,6 @@
               </a:rPr>
               <a:t> increases, the distribution of sample means becomes more normal, regardless of population distribution shape</a:t>
             </a:r>
-            <a:endParaRPr lang="en-US" dirty="0" smtClean="0">
-              <a:latin typeface="Calibri" charset="0"/>
-            </a:endParaRPr>
           </a:p>
         </p:txBody>
       </p:sp>
@@ -7402,8 +7480,27 @@
                 <a:ea typeface="Handwriting - Dakota" charset="0"/>
                 <a:cs typeface="Handwriting - Dakota" charset="0"/>
               </a:rPr>
-              <a:t>Super important concept alter!</a:t>
-            </a:r>
+              <a:t>Super important concept </a:t>
+            </a:r>
+            <a:r>
+              <a:rPr lang="en-US" b="1" dirty="0" smtClean="0">
+                <a:solidFill>
+                  <a:srgbClr val="FF0000"/>
+                </a:solidFill>
+                <a:latin typeface="Handwriting - Dakota" charset="0"/>
+                <a:ea typeface="Handwriting - Dakota" charset="0"/>
+                <a:cs typeface="Handwriting - Dakota" charset="0"/>
+              </a:rPr>
+              <a:t>alert!</a:t>
+            </a:r>
+            <a:endParaRPr lang="en-US" b="1" dirty="0" smtClean="0">
+              <a:solidFill>
+                <a:srgbClr val="FF0000"/>
+              </a:solidFill>
+              <a:latin typeface="Handwriting - Dakota" charset="0"/>
+              <a:ea typeface="Handwriting - Dakota" charset="0"/>
+              <a:cs typeface="Handwriting - Dakota" charset="0"/>
+            </a:endParaRPr>
           </a:p>
           <a:p>
             <a:pPr>
@@ -7516,7 +7613,13 @@
               <a:rPr lang="en-US" i="1" baseline="-25000" dirty="0">
                 <a:latin typeface="Calibri" charset="0"/>
               </a:rPr>
-              <a:t> X</a:t>
+              <a:t> </a:t>
+            </a:r>
+            <a:r>
+              <a:rPr lang="en-US" i="1" baseline="-25000" dirty="0">
+                <a:latin typeface="Calibri" charset="0"/>
+              </a:rPr>
+              <a:t>X̅</a:t>
             </a:r>
             <a:endParaRPr lang="en-US" dirty="0" smtClean="0">
               <a:latin typeface="Calibri" charset="0"/>
@@ -7673,8 +7776,27 @@
                     <a:ea typeface="Handwriting - Dakota" charset="0"/>
                     <a:cs typeface="Handwriting - Dakota" charset="0"/>
                   </a:rPr>
-                  <a:t>Super important concept alter!</a:t>
+                  <a:t>Super important concept </a:t>
                 </a:r>
+                <a:r>
+                  <a:rPr lang="en-US" b="1" dirty="0" smtClean="0">
+                    <a:solidFill>
+                      <a:srgbClr val="FF0000"/>
+                    </a:solidFill>
+                    <a:latin typeface="Handwriting - Dakota" charset="0"/>
+                    <a:ea typeface="Handwriting - Dakota" charset="0"/>
+                    <a:cs typeface="Handwriting - Dakota" charset="0"/>
+                  </a:rPr>
+                  <a:t>alert!</a:t>
+                </a:r>
+                <a:endParaRPr lang="en-US" b="1" dirty="0" smtClean="0">
+                  <a:solidFill>
+                    <a:srgbClr val="FF0000"/>
+                  </a:solidFill>
+                  <a:latin typeface="Handwriting - Dakota" charset="0"/>
+                  <a:ea typeface="Handwriting - Dakota" charset="0"/>
+                  <a:cs typeface="Handwriting - Dakota" charset="0"/>
+                </a:endParaRPr>
               </a:p>
               <a:p>
                 <a:pPr>
@@ -7837,9 +7959,6 @@
                   </a:rPr>
                   <a:t>Why is this super duper awesome?</a:t>
                 </a:r>
-                <a:endParaRPr lang="en-US" dirty="0" smtClean="0">
-                  <a:latin typeface="Calibri" charset="0"/>
-                </a:endParaRPr>
               </a:p>
             </p:txBody>
           </p:sp>

</xml_diff>